<commit_message>
fixed slides 13 and 21
</commit_message>
<xml_diff>
--- a/Whiteboard design session/WDS trainer presentation - Building a resilient IaaS architecture.pptx
+++ b/Whiteboard design session/WDS trainer presentation - Building a resilient IaaS architecture.pptx
@@ -242,7 +242,7 @@
           <a:p>
             <a:fld id="{D12B4A29-5F37-4DEF-BB05-EEA5E91F514E}" type="datetimeFigureOut">
               <a:rPr lang="en-US" smtClean="0"/>
-              <a:t>7/13/2018</a:t>
+              <a:t>7/16/2018</a:t>
             </a:fld>
             <a:endParaRPr lang="en-US" dirty="0"/>
           </a:p>
@@ -22938,7 +22938,7 @@
             <a:pPr lvl="0"/>
             <a:r>
               <a:rPr lang="en-US" sz="3200" dirty="0"/>
-              <a:t>The web application needs to have the ability to scale as we grow. that aspect of the cloud will allow this to be a reality? </a:t>
+              <a:t>The web application needs to have the ability to scale as we grow. That aspect of the cloud will allow this to be a reality? </a:t>
             </a:r>
           </a:p>
           <a:p>
@@ -25910,7 +25910,7 @@
       </p:grpSpPr>
       <p:pic>
         <p:nvPicPr>
-          <p:cNvPr id="4" name="Picture 3">
+          <p:cNvPr id="4" name="Picture 3" descr="A diagram that depicts two virtual networks peered and connected to multiple on-premises sites using site-to-site VPN." title="Recommended solution design">
             <a:extLst>
               <a:ext uri="{FF2B5EF4-FFF2-40B4-BE49-F238E27FC236}">
                 <a16:creationId xmlns:a16="http://schemas.microsoft.com/office/drawing/2014/main" id="{EF6AB932-4EB0-4F02-89C6-5C3FD9561143}"/>
@@ -31460,6 +31460,24 @@
 </file>
 
 <file path=customXml/item1.xml><?xml version="1.0" encoding="utf-8"?>
+<p:properties xmlns:p="http://schemas.microsoft.com/office/2006/metadata/properties" xmlns:xsi="http://www.w3.org/2001/XMLSchema-instance" xmlns:pc="http://schemas.microsoft.com/office/infopath/2007/PartnerControls">
+  <documentManagement>
+    <_ip_UnifiedCompliancePolicyUIAction xmlns="http://schemas.microsoft.com/sharepoint/v3" xsi:nil="true"/>
+    <_ip_UnifiedCompliancePolicyProperties xmlns="http://schemas.microsoft.com/sharepoint/v3" xsi:nil="true"/>
+  </documentManagement>
+</p:properties>
+</file>
+
+<file path=customXml/item2.xml><?xml version="1.0" encoding="utf-8"?>
+<?mso-contentType ?>
+<FormTemplates xmlns="http://schemas.microsoft.com/sharepoint/v3/contenttype/forms">
+  <Display>DocumentLibraryForm</Display>
+  <Edit>DocumentLibraryForm</Edit>
+  <New>DocumentLibraryForm</New>
+</FormTemplates>
+</file>
+
+<file path=customXml/item3.xml><?xml version="1.0" encoding="utf-8"?>
 <ct:contentTypeSchema xmlns:ct="http://schemas.microsoft.com/office/2006/metadata/contentType" xmlns:ma="http://schemas.microsoft.com/office/2006/metadata/properties/metaAttributes" ct:_="" ma:_="" ma:contentTypeName="Document" ma:contentTypeID="0x010100D15DFA3690A15B4081582BBCC6BEAC3E" ma:contentTypeVersion="9" ma:contentTypeDescription="Create a new document." ma:contentTypeScope="" ma:versionID="642da1784587cbe85a7fdbbe4dc36103">
   <xsd:schema xmlns:xsd="http://www.w3.org/2001/XMLSchema" xmlns:xs="http://www.w3.org/2001/XMLSchema" xmlns:p="http://schemas.microsoft.com/office/2006/metadata/properties" xmlns:ns1="http://schemas.microsoft.com/sharepoint/v3" xmlns:ns2="2023ac63-7b75-4916-a9ee-591457758eee" xmlns:ns3="d9c797ad-d7c3-4982-82b7-81352a75e4a5" targetNamespace="http://schemas.microsoft.com/office/2006/metadata/properties" ma:root="true" ma:fieldsID="91198b0246576053cc55dd2c67035a89" ns1:_="" ns2:_="" ns3:_="">
     <xsd:import namespace="http://schemas.microsoft.com/sharepoint/v3"/>
@@ -31661,25 +31679,33 @@
 </ct:contentTypeSchema>
 </file>
 
-<file path=customXml/item2.xml><?xml version="1.0" encoding="utf-8"?>
-<?mso-contentType ?>
-<FormTemplates xmlns="http://schemas.microsoft.com/sharepoint/v3/contenttype/forms">
-  <Display>DocumentLibraryForm</Display>
-  <Edit>DocumentLibraryForm</Edit>
-  <New>DocumentLibraryForm</New>
-</FormTemplates>
+<file path=customXml/itemProps1.xml><?xml version="1.0" encoding="utf-8"?>
+<ds:datastoreItem xmlns:ds="http://schemas.openxmlformats.org/officeDocument/2006/customXml" ds:itemID="{7D07577D-30E5-48FB-B81C-E1B9EAC126B5}">
+  <ds:schemaRefs>
+    <ds:schemaRef ds:uri="http://schemas.microsoft.com/sharepoint/v3"/>
+    <ds:schemaRef ds:uri="http://purl.org/dc/terms/"/>
+    <ds:schemaRef ds:uri="http://schemas.openxmlformats.org/package/2006/metadata/core-properties"/>
+    <ds:schemaRef ds:uri="http://schemas.microsoft.com/office/2006/documentManagement/types"/>
+    <ds:schemaRef ds:uri="http://schemas.microsoft.com/office/infopath/2007/PartnerControls"/>
+    <ds:schemaRef ds:uri="2023ac63-7b75-4916-a9ee-591457758eee"/>
+    <ds:schemaRef ds:uri="http://purl.org/dc/elements/1.1/"/>
+    <ds:schemaRef ds:uri="http://schemas.microsoft.com/office/2006/metadata/properties"/>
+    <ds:schemaRef ds:uri="d9c797ad-d7c3-4982-82b7-81352a75e4a5"/>
+    <ds:schemaRef ds:uri="http://www.w3.org/XML/1998/namespace"/>
+    <ds:schemaRef ds:uri="http://purl.org/dc/dcmitype/"/>
+  </ds:schemaRefs>
+</ds:datastoreItem>
 </file>
 
-<file path=customXml/item3.xml><?xml version="1.0" encoding="utf-8"?>
-<p:properties xmlns:p="http://schemas.microsoft.com/office/2006/metadata/properties" xmlns:xsi="http://www.w3.org/2001/XMLSchema-instance" xmlns:pc="http://schemas.microsoft.com/office/infopath/2007/PartnerControls">
-  <documentManagement>
-    <_ip_UnifiedCompliancePolicyUIAction xmlns="http://schemas.microsoft.com/sharepoint/v3" xsi:nil="true"/>
-    <_ip_UnifiedCompliancePolicyProperties xmlns="http://schemas.microsoft.com/sharepoint/v3" xsi:nil="true"/>
-  </documentManagement>
-</p:properties>
+<file path=customXml/itemProps2.xml><?xml version="1.0" encoding="utf-8"?>
+<ds:datastoreItem xmlns:ds="http://schemas.openxmlformats.org/officeDocument/2006/customXml" ds:itemID="{D5A22677-9165-4AB6-9580-CE94CCD209C5}">
+  <ds:schemaRefs>
+    <ds:schemaRef ds:uri="http://schemas.microsoft.com/sharepoint/v3/contenttype/forms"/>
+  </ds:schemaRefs>
+</ds:datastoreItem>
 </file>
 
-<file path=customXml/itemProps1.xml><?xml version="1.0" encoding="utf-8"?>
+<file path=customXml/itemProps3.xml><?xml version="1.0" encoding="utf-8"?>
 <ds:datastoreItem xmlns:ds="http://schemas.openxmlformats.org/officeDocument/2006/customXml" ds:itemID="{A26E40F2-DB1A-4ED5-85D8-FAE814896E97}">
   <ds:schemaRefs>
     <ds:schemaRef ds:uri="http://schemas.microsoft.com/office/2006/metadata/contentType"/>
@@ -31697,30 +31723,4 @@
     <ds:schemaRef ds:uri="http://schemas.microsoft.com/internal/obd"/>
   </ds:schemaRefs>
 </ds:datastoreItem>
-</file>
-
-<file path=customXml/itemProps2.xml><?xml version="1.0" encoding="utf-8"?>
-<ds:datastoreItem xmlns:ds="http://schemas.openxmlformats.org/officeDocument/2006/customXml" ds:itemID="{D5A22677-9165-4AB6-9580-CE94CCD209C5}">
-  <ds:schemaRefs>
-    <ds:schemaRef ds:uri="http://schemas.microsoft.com/sharepoint/v3/contenttype/forms"/>
-  </ds:schemaRefs>
-</ds:datastoreItem>
-</file>
-
-<file path=customXml/itemProps3.xml><?xml version="1.0" encoding="utf-8"?>
-<ds:datastoreItem xmlns:ds="http://schemas.openxmlformats.org/officeDocument/2006/customXml" ds:itemID="{7D07577D-30E5-48FB-B81C-E1B9EAC126B5}">
-  <ds:schemaRefs>
-    <ds:schemaRef ds:uri="http://schemas.microsoft.com/sharepoint/v3"/>
-    <ds:schemaRef ds:uri="http://purl.org/dc/terms/"/>
-    <ds:schemaRef ds:uri="http://schemas.openxmlformats.org/package/2006/metadata/core-properties"/>
-    <ds:schemaRef ds:uri="http://schemas.microsoft.com/office/2006/documentManagement/types"/>
-    <ds:schemaRef ds:uri="http://schemas.microsoft.com/office/infopath/2007/PartnerControls"/>
-    <ds:schemaRef ds:uri="2023ac63-7b75-4916-a9ee-591457758eee"/>
-    <ds:schemaRef ds:uri="http://purl.org/dc/elements/1.1/"/>
-    <ds:schemaRef ds:uri="http://schemas.microsoft.com/office/2006/metadata/properties"/>
-    <ds:schemaRef ds:uri="d9c797ad-d7c3-4982-82b7-81352a75e4a5"/>
-    <ds:schemaRef ds:uri="http://www.w3.org/XML/1998/namespace"/>
-    <ds:schemaRef ds:uri="http://purl.org/dc/dcmitype/"/>
-  </ds:schemaRefs>
-</ds:datastoreItem>
 </file>
</xml_diff>

<commit_message>
closes #8 and closes #9
</commit_message>
<xml_diff>
--- a/Whiteboard design session/WDS trainer presentation - Building a resilient IaaS architecture.pptx
+++ b/Whiteboard design session/WDS trainer presentation - Building a resilient IaaS architecture.pptx
@@ -242,7 +242,7 @@
           <a:p>
             <a:fld id="{D12B4A29-5F37-4DEF-BB05-EEA5E91F514E}" type="datetimeFigureOut">
               <a:rPr lang="en-US" smtClean="0"/>
-              <a:t>9/5/2018</a:t>
+              <a:t>10/2/2018</a:t>
             </a:fld>
             <a:endParaRPr lang="en-US" dirty="0"/>
           </a:p>
@@ -22612,7 +22612,7 @@
       </p:sp>
       <p:pic>
         <p:nvPicPr>
-          <p:cNvPr id="7" name="Picture 6">
+          <p:cNvPr id="7" name="Picture 6" descr="The SQL and Web Server Current Implementation diagram depicts three virtual machines behind a load balancer and availability set, and a single virtual machine for SQL server with two disks for data.">
             <a:extLst>
               <a:ext uri="{FF2B5EF4-FFF2-40B4-BE49-F238E27FC236}">
                 <a16:creationId xmlns:a16="http://schemas.microsoft.com/office/drawing/2014/main" id="{117245A7-96EB-45F0-95E0-52B223EB7F86}"/>
@@ -30152,7 +30152,7 @@
       </p:sp>
       <p:pic>
         <p:nvPicPr>
-          <p:cNvPr id="19" name="Picture 18">
+          <p:cNvPr id="19" name="Picture 18" descr="This image represents a single domain controller in the West Central US region.">
             <a:extLst>
               <a:ext uri="{FF2B5EF4-FFF2-40B4-BE49-F238E27FC236}">
                 <a16:creationId xmlns:a16="http://schemas.microsoft.com/office/drawing/2014/main" id="{F5B7BF65-5DC8-448E-9685-F007557ADAA4}"/>
@@ -31364,6 +31364,15 @@
 </file>
 
 <file path=customXml/item1.xml><?xml version="1.0" encoding="utf-8"?>
+<?mso-contentType ?>
+<FormTemplates xmlns="http://schemas.microsoft.com/sharepoint/v3/contenttype/forms">
+  <Display>DocumentLibraryForm</Display>
+  <Edit>DocumentLibraryForm</Edit>
+  <New>DocumentLibraryForm</New>
+</FormTemplates>
+</file>
+
+<file path=customXml/item2.xml><?xml version="1.0" encoding="utf-8"?>
 <ct:contentTypeSchema xmlns:ct="http://schemas.microsoft.com/office/2006/metadata/contentType" xmlns:ma="http://schemas.microsoft.com/office/2006/metadata/properties/metaAttributes" ct:_="" ma:_="" ma:contentTypeName="Document" ma:contentTypeID="0x010100D15DFA3690A15B4081582BBCC6BEAC3E" ma:contentTypeVersion="9" ma:contentTypeDescription="Create a new document." ma:contentTypeScope="" ma:versionID="642da1784587cbe85a7fdbbe4dc36103">
   <xsd:schema xmlns:xsd="http://www.w3.org/2001/XMLSchema" xmlns:xs="http://www.w3.org/2001/XMLSchema" xmlns:p="http://schemas.microsoft.com/office/2006/metadata/properties" xmlns:ns1="http://schemas.microsoft.com/sharepoint/v3" xmlns:ns2="2023ac63-7b75-4916-a9ee-591457758eee" xmlns:ns3="d9c797ad-d7c3-4982-82b7-81352a75e4a5" targetNamespace="http://schemas.microsoft.com/office/2006/metadata/properties" ma:root="true" ma:fieldsID="91198b0246576053cc55dd2c67035a89" ns1:_="" ns2:_="" ns3:_="">
     <xsd:import namespace="http://schemas.microsoft.com/sharepoint/v3"/>
@@ -31565,15 +31574,6 @@
 </ct:contentTypeSchema>
 </file>
 
-<file path=customXml/item2.xml><?xml version="1.0" encoding="utf-8"?>
-<?mso-contentType ?>
-<FormTemplates xmlns="http://schemas.microsoft.com/sharepoint/v3/contenttype/forms">
-  <Display>DocumentLibraryForm</Display>
-  <Edit>DocumentLibraryForm</Edit>
-  <New>DocumentLibraryForm</New>
-</FormTemplates>
-</file>
-
 <file path=customXml/item3.xml><?xml version="1.0" encoding="utf-8"?>
 <p:properties xmlns:p="http://schemas.microsoft.com/office/2006/metadata/properties" xmlns:xsi="http://www.w3.org/2001/XMLSchema-instance" xmlns:pc="http://schemas.microsoft.com/office/infopath/2007/PartnerControls">
   <documentManagement>
@@ -31584,6 +31584,14 @@
 </file>
 
 <file path=customXml/itemProps1.xml><?xml version="1.0" encoding="utf-8"?>
+<ds:datastoreItem xmlns:ds="http://schemas.openxmlformats.org/officeDocument/2006/customXml" ds:itemID="{D5A22677-9165-4AB6-9580-CE94CCD209C5}">
+  <ds:schemaRefs>
+    <ds:schemaRef ds:uri="http://schemas.microsoft.com/sharepoint/v3/contenttype/forms"/>
+  </ds:schemaRefs>
+</ds:datastoreItem>
+</file>
+
+<file path=customXml/itemProps2.xml><?xml version="1.0" encoding="utf-8"?>
 <ds:datastoreItem xmlns:ds="http://schemas.openxmlformats.org/officeDocument/2006/customXml" ds:itemID="{A26E40F2-DB1A-4ED5-85D8-FAE814896E97}">
   <ds:schemaRefs>
     <ds:schemaRef ds:uri="http://schemas.microsoft.com/office/2006/metadata/contentType"/>
@@ -31599,14 +31607,6 @@
     <ds:schemaRef ds:uri="http://purl.org/dc/elements/1.1/"/>
     <ds:schemaRef ds:uri="http://purl.org/dc/terms/"/>
     <ds:schemaRef ds:uri="http://schemas.microsoft.com/internal/obd"/>
-  </ds:schemaRefs>
-</ds:datastoreItem>
-</file>
-
-<file path=customXml/itemProps2.xml><?xml version="1.0" encoding="utf-8"?>
-<ds:datastoreItem xmlns:ds="http://schemas.openxmlformats.org/officeDocument/2006/customXml" ds:itemID="{D5A22677-9165-4AB6-9580-CE94CCD209C5}">
-  <ds:schemaRefs>
-    <ds:schemaRef ds:uri="http://schemas.microsoft.com/sharepoint/v3/contenttype/forms"/>
   </ds:schemaRefs>
 </ds:datastoreItem>
 </file>

</xml_diff>

<commit_message>
moving scotts updates to the nov branch
</commit_message>
<xml_diff>
--- a/Whiteboard design session/WDS trainer presentation - Building a resilient IaaS architecture.pptx
+++ b/Whiteboard design session/WDS trainer presentation - Building a resilient IaaS architecture.pptx
@@ -242,7 +242,7 @@
           <a:p>
             <a:fld id="{D12B4A29-5F37-4DEF-BB05-EEA5E91F514E}" type="datetimeFigureOut">
               <a:rPr lang="en-US" smtClean="0"/>
-              <a:t>10/2/2018</a:t>
+              <a:t>31-Oct-18</a:t>
             </a:fld>
             <a:endParaRPr lang="en-US" dirty="0"/>
           </a:p>
@@ -26357,6 +26357,84 @@
               <a:rPr lang="en-US" dirty="0"/>
             </a:br>
             <a:endParaRPr lang="en-US" dirty="0"/>
+          </a:p>
+        </p:txBody>
+      </p:sp>
+      <p:sp>
+        <p:nvSpPr>
+          <p:cNvPr id="2" name="Rectangle 1">
+            <a:extLst>
+              <a:ext uri="{FF2B5EF4-FFF2-40B4-BE49-F238E27FC236}">
+                <a16:creationId xmlns:a16="http://schemas.microsoft.com/office/drawing/2014/main" id="{30061D15-6323-4CB6-A727-C243A2C3C21B}"/>
+              </a:ext>
+            </a:extLst>
+          </p:cNvPr>
+          <p:cNvSpPr/>
+          <p:nvPr/>
+        </p:nvSpPr>
+        <p:spPr bwMode="auto">
+          <a:xfrm>
+            <a:off x="7328263" y="4611188"/>
+            <a:ext cx="1593669" cy="209006"/>
+          </a:xfrm>
+          <a:prstGeom prst="rect">
+            <a:avLst/>
+          </a:prstGeom>
+          <a:solidFill>
+            <a:schemeClr val="tx1"/>
+          </a:solidFill>
+          <a:ln>
+            <a:noFill/>
+            <a:headEnd type="none" w="med" len="med"/>
+            <a:tailEnd type="none" w="med" len="med"/>
+          </a:ln>
+          <a:effectLst/>
+        </p:spPr>
+        <p:style>
+          <a:lnRef idx="1">
+            <a:schemeClr val="accent2"/>
+          </a:lnRef>
+          <a:fillRef idx="3">
+            <a:schemeClr val="accent2"/>
+          </a:fillRef>
+          <a:effectRef idx="2">
+            <a:schemeClr val="accent2"/>
+          </a:effectRef>
+          <a:fontRef idx="minor">
+            <a:schemeClr val="lt1"/>
+          </a:fontRef>
+        </p:style>
+        <p:txBody>
+          <a:bodyPr rot="0" spcFirstLastPara="0" vertOverflow="overflow" horzOverflow="overflow" vert="horz" wrap="square" lIns="182880" tIns="146304" rIns="182880" bIns="146304" numCol="1" spcCol="0" rtlCol="0" fromWordArt="0" anchor="ctr" anchorCtr="0" forceAA="0" compatLnSpc="1">
+            <a:prstTxWarp prst="textNoShape">
+              <a:avLst/>
+            </a:prstTxWarp>
+            <a:noAutofit/>
+          </a:bodyPr>
+          <a:lstStyle/>
+          <a:p>
+            <a:pPr algn="ctr" defTabSz="932472" fontAlgn="base">
+              <a:lnSpc>
+                <a:spcPct val="90000"/>
+              </a:lnSpc>
+              <a:spcBef>
+                <a:spcPct val="0"/>
+              </a:spcBef>
+              <a:spcAft>
+                <a:spcPct val="0"/>
+              </a:spcAft>
+            </a:pPr>
+            <a:r>
+              <a:rPr lang="en-US" sz="1050" b="1" dirty="0">
+                <a:solidFill>
+                  <a:schemeClr val="bg1"/>
+                </a:solidFill>
+                <a:latin typeface="Segoe UI" panose="020B0502040204020203" pitchFamily="34" charset="0"/>
+                <a:ea typeface="Segoe UI" panose="020B0502040204020203" pitchFamily="34" charset="0"/>
+                <a:cs typeface="Segoe UI" panose="020B0502040204020203" pitchFamily="34" charset="0"/>
+              </a:rPr>
+              <a:t>Availability Zone</a:t>
+            </a:r>
           </a:p>
         </p:txBody>
       </p:sp>
@@ -31364,15 +31442,6 @@
 </file>
 
 <file path=customXml/item1.xml><?xml version="1.0" encoding="utf-8"?>
-<?mso-contentType ?>
-<FormTemplates xmlns="http://schemas.microsoft.com/sharepoint/v3/contenttype/forms">
-  <Display>DocumentLibraryForm</Display>
-  <Edit>DocumentLibraryForm</Edit>
-  <New>DocumentLibraryForm</New>
-</FormTemplates>
-</file>
-
-<file path=customXml/item2.xml><?xml version="1.0" encoding="utf-8"?>
 <ct:contentTypeSchema xmlns:ct="http://schemas.microsoft.com/office/2006/metadata/contentType" xmlns:ma="http://schemas.microsoft.com/office/2006/metadata/properties/metaAttributes" ct:_="" ma:_="" ma:contentTypeName="Document" ma:contentTypeID="0x010100D15DFA3690A15B4081582BBCC6BEAC3E" ma:contentTypeVersion="9" ma:contentTypeDescription="Create a new document." ma:contentTypeScope="" ma:versionID="642da1784587cbe85a7fdbbe4dc36103">
   <xsd:schema xmlns:xsd="http://www.w3.org/2001/XMLSchema" xmlns:xs="http://www.w3.org/2001/XMLSchema" xmlns:p="http://schemas.microsoft.com/office/2006/metadata/properties" xmlns:ns1="http://schemas.microsoft.com/sharepoint/v3" xmlns:ns2="2023ac63-7b75-4916-a9ee-591457758eee" xmlns:ns3="d9c797ad-d7c3-4982-82b7-81352a75e4a5" targetNamespace="http://schemas.microsoft.com/office/2006/metadata/properties" ma:root="true" ma:fieldsID="91198b0246576053cc55dd2c67035a89" ns1:_="" ns2:_="" ns3:_="">
     <xsd:import namespace="http://schemas.microsoft.com/sharepoint/v3"/>
@@ -31574,6 +31643,15 @@
 </ct:contentTypeSchema>
 </file>
 
+<file path=customXml/item2.xml><?xml version="1.0" encoding="utf-8"?>
+<?mso-contentType ?>
+<FormTemplates xmlns="http://schemas.microsoft.com/sharepoint/v3/contenttype/forms">
+  <Display>DocumentLibraryForm</Display>
+  <Edit>DocumentLibraryForm</Edit>
+  <New>DocumentLibraryForm</New>
+</FormTemplates>
+</file>
+
 <file path=customXml/item3.xml><?xml version="1.0" encoding="utf-8"?>
 <p:properties xmlns:p="http://schemas.microsoft.com/office/2006/metadata/properties" xmlns:xsi="http://www.w3.org/2001/XMLSchema-instance" xmlns:pc="http://schemas.microsoft.com/office/infopath/2007/PartnerControls">
   <documentManagement>
@@ -31584,14 +31662,6 @@
 </file>
 
 <file path=customXml/itemProps1.xml><?xml version="1.0" encoding="utf-8"?>
-<ds:datastoreItem xmlns:ds="http://schemas.openxmlformats.org/officeDocument/2006/customXml" ds:itemID="{D5A22677-9165-4AB6-9580-CE94CCD209C5}">
-  <ds:schemaRefs>
-    <ds:schemaRef ds:uri="http://schemas.microsoft.com/sharepoint/v3/contenttype/forms"/>
-  </ds:schemaRefs>
-</ds:datastoreItem>
-</file>
-
-<file path=customXml/itemProps2.xml><?xml version="1.0" encoding="utf-8"?>
 <ds:datastoreItem xmlns:ds="http://schemas.openxmlformats.org/officeDocument/2006/customXml" ds:itemID="{A26E40F2-DB1A-4ED5-85D8-FAE814896E97}">
   <ds:schemaRefs>
     <ds:schemaRef ds:uri="http://schemas.microsoft.com/office/2006/metadata/contentType"/>
@@ -31607,6 +31677,14 @@
     <ds:schemaRef ds:uri="http://purl.org/dc/elements/1.1/"/>
     <ds:schemaRef ds:uri="http://purl.org/dc/terms/"/>
     <ds:schemaRef ds:uri="http://schemas.microsoft.com/internal/obd"/>
+  </ds:schemaRefs>
+</ds:datastoreItem>
+</file>
+
+<file path=customXml/itemProps2.xml><?xml version="1.0" encoding="utf-8"?>
+<ds:datastoreItem xmlns:ds="http://schemas.openxmlformats.org/officeDocument/2006/customXml" ds:itemID="{D5A22677-9165-4AB6-9580-CE94CCD209C5}">
+  <ds:schemaRefs>
+    <ds:schemaRef ds:uri="http://schemas.microsoft.com/sharepoint/v3/contenttype/forms"/>
   </ds:schemaRefs>
 </ds:datastoreItem>
 </file>

</xml_diff>

<commit_message>
Major updates for June 2020
</commit_message>
<xml_diff>
--- a/Whiteboard design session/WDS trainer presentation - Building a resilient IaaS architecture.pptx
+++ b/Whiteboard design session/WDS trainer presentation - Building a resilient IaaS architecture.pptx
@@ -238,7 +238,7 @@
           <a:p>
             <a:fld id="{D12B4A29-5F37-4DEF-BB05-EEA5E91F514E}" type="datetimeFigureOut">
               <a:rPr lang="en-US" smtClean="0"/>
-              <a:t>6/19/2020</a:t>
+              <a:t>6/30/2020</a:t>
             </a:fld>
             <a:endParaRPr lang="en-US" dirty="0"/>
           </a:p>
@@ -2832,6 +2832,32 @@
                 <a:ea typeface="+mn-ea"/>
                 <a:cs typeface="+mn-cs"/>
               </a:rPr>
+              <a:t>-  Each SQL Server Enterprise license includes one additional license for a DR server. Hence of the 4 SQL VMs, only 2 need the SQL license. </a:t>
+            </a:r>
+            <a:r>
+              <a:rPr lang="en-US" sz="1200" b="1" kern="1200" dirty="0">
+                <a:solidFill>
+                  <a:schemeClr val="tx1"/>
+                </a:solidFill>
+                <a:effectLst/>
+                <a:latin typeface="+mn-lt"/>
+                <a:ea typeface="+mn-ea"/>
+                <a:cs typeface="+mn-cs"/>
+              </a:rPr>
+              <a:t>This is a substantial saving.</a:t>
+            </a:r>
+          </a:p>
+          <a:p>
+            <a:r>
+              <a:rPr lang="en-US" sz="1200" b="0" kern="1200" dirty="0">
+                <a:solidFill>
+                  <a:schemeClr val="tx1"/>
+                </a:solidFill>
+                <a:effectLst/>
+                <a:latin typeface="+mn-lt"/>
+                <a:ea typeface="+mn-ea"/>
+                <a:cs typeface="+mn-cs"/>
+              </a:rPr>
               <a:t>-  Data between Availability Zones in the same region will be billed from Feb 1, 2021</a:t>
             </a:r>
           </a:p>
@@ -2930,7 +2956,7 @@
                 <a:ea typeface="+mn-ea"/>
                 <a:cs typeface="+mn-cs"/>
               </a:rPr>
-              <a:t>This compares with a monthly total for the IaaS implementation of </a:t>
+              <a:t>This compares with a monthly total for the IaaS implementation of </a:t>
             </a:r>
             <a:r>
               <a:rPr lang="en-US" sz="1200" b="1" kern="1200" dirty="0">
@@ -2942,7 +2968,7 @@
                 <a:ea typeface="+mn-ea"/>
                 <a:cs typeface="+mn-cs"/>
               </a:rPr>
-              <a:t>**$7,162.60**</a:t>
+              <a:t>**$4,949.42** </a:t>
             </a:r>
             <a:r>
               <a:rPr lang="en-US" sz="1200" b="0" kern="1200" dirty="0">
@@ -2954,11 +2980,22 @@
                 <a:ea typeface="+mn-ea"/>
                 <a:cs typeface="+mn-cs"/>
               </a:rPr>
-              <a:t> (excluding infra costs, on the assumption these are still required for other applications).</a:t>
-            </a:r>
-          </a:p>
-          <a:p>
-            <a:br>
+              <a:t>(excluding infra costs, on the assumption these are still required for other applications).</a:t>
+            </a:r>
+          </a:p>
+          <a:p>
+            <a:endParaRPr lang="en-US" sz="1200" b="0" kern="1200" dirty="0">
+              <a:solidFill>
+                <a:schemeClr val="tx1"/>
+              </a:solidFill>
+              <a:effectLst/>
+              <a:latin typeface="+mn-lt"/>
+              <a:ea typeface="+mn-ea"/>
+              <a:cs typeface="+mn-cs"/>
+            </a:endParaRPr>
+          </a:p>
+          <a:p>
+            <a:r>
               <a:rPr lang="en-US" sz="1200" b="0" kern="1200" dirty="0">
                 <a:solidFill>
                   <a:schemeClr val="tx1"/>
@@ -2968,18 +3005,7 @@
                 <a:ea typeface="+mn-ea"/>
                 <a:cs typeface="+mn-cs"/>
               </a:rPr>
-            </a:br>
-            <a:r>
-              <a:rPr lang="en-US" sz="1200" b="0" kern="1200" dirty="0">
-                <a:solidFill>
-                  <a:schemeClr val="tx1"/>
-                </a:solidFill>
-                <a:effectLst/>
-                <a:latin typeface="+mn-lt"/>
-                <a:ea typeface="+mn-ea"/>
-                <a:cs typeface="+mn-cs"/>
-              </a:rPr>
-              <a:t>The PaaS implementation is marginally more expensive. However a cost-only comparison does not take into account the considerable additional benefits of a PaaS-based approach, e.g. reduced </a:t>
+              <a:t>The PaaS implementation is roughly the same price. However a cost-only comparison does not take into account the considerable additional benefits of a PaaS-based approach, e.g. reduced </a:t>
             </a:r>
             <a:r>
               <a:rPr lang="en-US" sz="1200" b="0" kern="1200" dirty="0" err="1">
@@ -3003,10 +3029,8 @@
                 <a:ea typeface="+mn-ea"/>
                 <a:cs typeface="+mn-cs"/>
               </a:rPr>
-              <a:t> overhead. Overall, the PaaS solutions offers significantly better value.</a:t>
-            </a:r>
-          </a:p>
-          <a:p>
+              <a:t> overhead. Overall, the PaaS solutions offers significantly better value.</a:t>
+            </a:r>
             <a:endParaRPr lang="en-IE" dirty="0"/>
           </a:p>
         </p:txBody>
@@ -3581,7 +3605,7 @@
                 <a:ea typeface="+mn-ea"/>
                 <a:cs typeface="+mn-cs"/>
               </a:rPr>
-              <a:t>Contoso Inc. manufactures, sells, distributes, and services parts for major appliances and HVAC systems for large corporations and independent firms. The ordering system is currently housed in Azure on IaaS SQL server instances. Initially, the ordering process was done mainly via phone and expanded to email. Recently, the company has moved to an internet based ordering system with IIS Web Servers in Azure housing the front-end application for the ordering, invoicing, and support options.</a:t>
+              <a:t>Contoso Inc. manufactures, sells, distributes, and services parts for major appliances and HVAC systems for large corporations and independent firms. The claims application is currently housed in Azure on IaaS SQL server instances. Initially, the claims process was done mainly via phone and expanded to email. Recently, the company has moved to an internet-based claims application with IIS Web Servers in Azure housing the front-end application for the claims, invoicing, and support options.</a:t>
             </a:r>
           </a:p>
           <a:p>
@@ -3684,7 +3708,7 @@
                 <a:ea typeface="+mn-ea"/>
                 <a:cs typeface="+mn-cs"/>
               </a:rPr>
-              <a:t>Each branch office is small enough that there are no servers housed on-site. Each location has direct connectivity to corporate resources through a VPN connection to the Austin headquarters. Email is accessed via web as is the main ordering application. </a:t>
+              <a:t>Each branch office is small enough that there are no servers housed on-site. Each location has direct connectivity to corporate resources through a VPN connection to the Austin headquarters. Email is accessed via web as is the main claims application. </a:t>
             </a:r>
           </a:p>
           <a:p>
@@ -21894,7 +21918,7 @@
             </a:pPr>
             <a:r>
               <a:rPr lang="en-US" sz="3200" dirty="0"/>
-              <a:t>Redundancy and resiliency for the ADDS domain controller server, and the web and database servers for the Ordering application, to deliver the 99.95% or greater SLA required by the business.</a:t>
+              <a:t>Redundancy and resiliency for the ADDS domain controller server, and the web and database servers for the claims application, to deliver the 99.95% or greater SLA required by the business.</a:t>
             </a:r>
           </a:p>
           <a:p>
@@ -21914,7 +21938,7 @@
             </a:pPr>
             <a:r>
               <a:rPr lang="en-US" sz="3200" dirty="0"/>
-              <a:t>An automated mechanism for a quick recovery of the ordering application in the event of disaster impacting the entire West Central US Azure region.</a:t>
+              <a:t>An automated mechanism for a quick recovery of the claims application in the event of disaster impacting the entire West Central US Azure region.</a:t>
             </a:r>
           </a:p>
           <a:p>
@@ -22031,7 +22055,7 @@
             </a:pPr>
             <a:r>
               <a:rPr lang="en-US" sz="3200" dirty="0"/>
-              <a:t>An understanding of how to achieve an equivalent level of high availability, disaster recovery and backup for the next-generation PaaS-based implementation of the Ordering application.</a:t>
+              <a:t>An understanding of how to achieve an equivalent level of high availability, disaster recovery and backup for the next-generation PaaS-based implementation of the claims application.</a:t>
             </a:r>
           </a:p>
           <a:p>
@@ -23936,7 +23960,7 @@
           <a:p>
             <a:r>
               <a:rPr lang="en-US" sz="3200" dirty="0"/>
-              <a:t>You should also aim to identify the business owner of the Ordering application and the key stakeholders of the business impact analysis that provided the executive mandate for improved resiliency</a:t>
+              <a:t>You should also aim to identify the business owner of the claims application and the key stakeholders of the business impact analysis that provided the executive mandate for improved resiliency</a:t>
             </a:r>
           </a:p>
         </p:txBody>
@@ -26467,7 +26491,7 @@
           <p:nvPr>
             <p:extLst>
               <p:ext uri="{D42A27DB-BD31-4B8C-83A1-F6EECF244321}">
-                <p14:modId xmlns:p14="http://schemas.microsoft.com/office/powerpoint/2010/main" val="4052811637"/>
+                <p14:modId xmlns:p14="http://schemas.microsoft.com/office/powerpoint/2010/main" val="2254514400"/>
               </p:ext>
             </p:extLst>
           </p:nvPr>
@@ -26723,10 +26747,10 @@
                     <a:p>
                       <a:pPr algn="r"/>
                       <a:r>
-                        <a:rPr lang="en-IE" sz="1400">
+                        <a:rPr lang="en-IE" sz="1400" dirty="0">
                           <a:effectLst/>
                         </a:rPr>
-                        <a:t>$3,001.02</a:t>
+                        <a:t>$1,906.02</a:t>
                       </a:r>
                     </a:p>
                   </a:txBody>
@@ -27220,10 +27244,10 @@
                     <a:p>
                       <a:pPr algn="r"/>
                       <a:r>
-                        <a:rPr lang="en-IE" sz="1400">
+                        <a:rPr lang="en-IE" sz="1400" dirty="0">
                           <a:effectLst/>
                         </a:rPr>
-                        <a:t>$2,708.94</a:t>
+                        <a:t>$1,613.64</a:t>
                       </a:r>
                     </a:p>
                   </a:txBody>
@@ -27617,7 +27641,7 @@
                           <a:latin typeface="Segoe UI Semibold" panose="020B0702040204020203" pitchFamily="34" charset="0"/>
                           <a:cs typeface="Segoe UI Semibold" panose="020B0702040204020203" pitchFamily="34" charset="0"/>
                         </a:rPr>
-                        <a:t>$7,162.60</a:t>
+                        <a:t>$4,949.42</a:t>
                       </a:r>
                     </a:p>
                   </a:txBody>
@@ -27709,7 +27733,7 @@
           <p:nvPr>
             <p:extLst>
               <p:ext uri="{D42A27DB-BD31-4B8C-83A1-F6EECF244321}">
-                <p14:modId xmlns:p14="http://schemas.microsoft.com/office/powerpoint/2010/main" val="338347002"/>
+                <p14:modId xmlns:p14="http://schemas.microsoft.com/office/powerpoint/2010/main" val="3464450666"/>
               </p:ext>
             </p:extLst>
           </p:nvPr>
@@ -27882,10 +27906,10 @@
                     <a:p>
                       <a:pPr algn="r"/>
                       <a:r>
-                        <a:rPr lang="en-IE" sz="1600">
+                        <a:rPr lang="en-IE" sz="1600" dirty="0">
                           <a:effectLst/>
                         </a:rPr>
-                        <a:t>$584.00</a:t>
+                        <a:t>$ 584.00</a:t>
                       </a:r>
                     </a:p>
                   </a:txBody>
@@ -27953,10 +27977,10 @@
                     <a:p>
                       <a:pPr algn="r"/>
                       <a:r>
-                        <a:rPr lang="en-IE" sz="1600">
+                        <a:rPr lang="en-IE" sz="1600" dirty="0">
                           <a:effectLst/>
                         </a:rPr>
-                        <a:t>$584.00</a:t>
+                        <a:t>$ 584.00</a:t>
                       </a:r>
                     </a:p>
                   </a:txBody>
@@ -28011,7 +28035,7 @@
                         <a:rPr lang="en-US" sz="1600" dirty="0">
                           <a:effectLst/>
                         </a:rPr>
-                        <a:t>Single DB, General Purpose, 8 </a:t>
+                        <a:t>Single DB, General Purpose, 4 </a:t>
                       </a:r>
                       <a:r>
                         <a:rPr lang="en-US" sz="1600" dirty="0" err="1">
@@ -28023,7 +28047,18 @@
                         <a:rPr lang="en-US" sz="1600" dirty="0">
                           <a:effectLst/>
                         </a:rPr>
-                        <a:t>, PAYG, 2 instances, 500GB, 1 year reservation. Backup: RA-GRS, 1TB point-in-time, 300GB average backup size, 26 weeks/12 months/3 years retention</a:t>
+                        <a:t>, PAYG, 2 instances, 500GB.</a:t>
+                      </a:r>
+                      <a:br>
+                        <a:rPr lang="en-US" sz="1600" dirty="0">
+                          <a:effectLst/>
+                        </a:rPr>
+                      </a:br>
+                      <a:r>
+                        <a:rPr lang="en-US" sz="1600" dirty="0">
+                          <a:effectLst/>
+                        </a:rPr>
+                        <a:t>Backup: RA-GRS, 1TB point-in-time, 300GB average backup size, 26 weeks/12 months/3 years retention</a:t>
                       </a:r>
                     </a:p>
                   </a:txBody>
@@ -28036,10 +28071,10 @@
                     <a:p>
                       <a:pPr algn="r"/>
                       <a:r>
-                        <a:rPr lang="en-IE" sz="1600">
+                        <a:rPr lang="en-IE" sz="1600" dirty="0">
                           <a:effectLst/>
                         </a:rPr>
-                        <a:t>$4,044.77</a:t>
+                        <a:t>$ 1,719.54</a:t>
                       </a:r>
                     </a:p>
                   </a:txBody>
@@ -28107,10 +28142,10 @@
                     <a:p>
                       <a:pPr algn="r"/>
                       <a:r>
-                        <a:rPr lang="en-IE" sz="1600">
+                        <a:rPr lang="en-IE" sz="1600" dirty="0">
                           <a:effectLst/>
                         </a:rPr>
-                        <a:t>$3,370.07</a:t>
+                        <a:t>$ 1,530.25</a:t>
                       </a:r>
                     </a:p>
                   </a:txBody>
@@ -28178,7 +28213,7 @@
                     <a:p>
                       <a:pPr algn="r"/>
                       <a:r>
-                        <a:rPr lang="en-IE" sz="1600">
+                        <a:rPr lang="en-IE" sz="1600" dirty="0">
                           <a:effectLst/>
                         </a:rPr>
                         <a:t>$ 6.12</a:t>
@@ -28249,7 +28284,7 @@
                     <a:p>
                       <a:pPr algn="r"/>
                       <a:r>
-                        <a:rPr lang="en-IE" sz="1600">
+                        <a:rPr lang="en-IE" sz="1600" dirty="0">
                           <a:effectLst/>
                         </a:rPr>
                         <a:t>$ 14.00</a:t>
@@ -28320,7 +28355,7 @@
                     <a:p>
                       <a:pPr algn="r"/>
                       <a:r>
-                        <a:rPr lang="en-IE" sz="1600">
+                        <a:rPr lang="en-IE" sz="1600" dirty="0">
                           <a:effectLst/>
                         </a:rPr>
                         <a:t>$ 43.07</a:t>
@@ -28391,7 +28426,7 @@
                     <a:p>
                       <a:pPr algn="r"/>
                       <a:r>
-                        <a:rPr lang="en-IE" sz="1600">
+                        <a:rPr lang="en-IE" sz="1600" dirty="0">
                           <a:effectLst/>
                         </a:rPr>
                         <a:t>$312.20</a:t>
@@ -28575,7 +28610,7 @@
                           <a:latin typeface="Segoe UI Semibold" panose="020B0702040204020203" pitchFamily="34" charset="0"/>
                           <a:cs typeface="Segoe UI Semibold" panose="020B0702040204020203" pitchFamily="34" charset="0"/>
                         </a:rPr>
-                        <a:t>$8,300.53</a:t>
+                        <a:t>$ 4,810.17</a:t>
                       </a:r>
                     </a:p>
                   </a:txBody>
@@ -29576,7 +29611,7 @@
         <p:spPr>
           <a:xfrm>
             <a:off x="269239" y="1189177"/>
-            <a:ext cx="11653523" cy="4219617"/>
+            <a:ext cx="11653523" cy="2482218"/>
           </a:xfrm>
         </p:spPr>
         <p:txBody>
@@ -29585,16 +29620,13 @@
           <a:p>
             <a:r>
               <a:rPr lang="en-US" sz="2800" dirty="0"/>
-              <a:t>Contoso Inc. is a leading manufacturer, seller, distributor, and servicer of parts for Heating, Venting and Air-Conditioning (HVAC) systems. Their customer base includes some of the largest corporations and independent firms in the US.</a:t>
-            </a:r>
-          </a:p>
-          <a:p>
-            <a:endParaRPr lang="en-US" sz="1100" dirty="0"/>
+              <a:t>Contoso Insurance (CI), headquartered in Miami, provides insurance solutions across North America. </a:t>
+            </a:r>
           </a:p>
           <a:p>
             <a:r>
               <a:rPr lang="en-US" sz="2800" dirty="0"/>
-              <a:t>Contoso specializes in the datacenter space, designing computer room air conditioning (CRAC) units and contracting in the planning of hyper-scale cloud provider datacenter cooling strategies. As such, the Research and Development group is one of the largest business units in the company.</a:t>
+              <a:t>Mobile agents located across the US visit claimants to verify their claims and upload information using the Claims Application.</a:t>
             </a:r>
           </a:p>
           <a:p>
@@ -29719,7 +29751,15 @@
           <a:p>
             <a:r>
               <a:rPr lang="en-US" sz="2800" dirty="0"/>
-              <a:t>The organization has an Internet-based Ordering application they recently deployed into Azure (in West Central US).</a:t>
+              <a:t>The organization has an </a:t>
+            </a:r>
+            <a:r>
+              <a:rPr lang="en-US" sz="2800"/>
+              <a:t>Internet-based claims </a:t>
+            </a:r>
+            <a:r>
+              <a:rPr lang="en-US" sz="2800" dirty="0"/>
+              <a:t>application they recently deployed into Azure (in West Central US).</a:t>
             </a:r>
           </a:p>
           <a:p>
@@ -29821,7 +29861,7 @@
           <a:p>
             <a:r>
               <a:rPr lang="en-US" sz="2800" dirty="0"/>
-              <a:t>Customers have reported reliability issues with the Ordering application. Failures were correlated to service health issues with the SQL VM.</a:t>
+              <a:t>Customers have reported reliability issues with the claims application. Failures were correlated to service health issues with the SQL VM.</a:t>
             </a:r>
           </a:p>
           <a:p>
@@ -29849,7 +29889,7 @@
           <a:p>
             <a:r>
               <a:rPr lang="en-US" sz="2800" dirty="0"/>
-              <a:t>Recent stability issues with the ordering system prompted Contoso to perform a business impact analysis of the application.</a:t>
+              <a:t>Recent stability issues with the claims application prompted Contoso to perform a business impact analysis of the application.</a:t>
             </a:r>
           </a:p>
           <a:p>
@@ -29859,7 +29899,7 @@
           <a:p>
             <a:r>
               <a:rPr lang="en-US" sz="2800" dirty="0"/>
-              <a:t>The result is an executive mandate to achieve an SLA of at least 99.95% for the Ordering application, with RTO of 4 hours and RPO of 6 hours, plus backup of all critical VMs and data.</a:t>
+              <a:t>The result is an executive mandate to achieve an SLA of at least 99.95% for the claims application, with RTO of 4 hours and RPO of 6 hours, plus backup of all critical VMs and data.</a:t>
             </a:r>
           </a:p>
         </p:txBody>
@@ -29941,7 +29981,7 @@
           <a:p>
             <a:r>
               <a:rPr lang="en-US" sz="2800" dirty="0"/>
-              <a:t>The App Dev team is working on a next-generation PaaS-based implementation of the Ordering Application.</a:t>
+              <a:t>The App Dev team is working on a next-generation PaaS-based implementation of the claims application.</a:t>
             </a:r>
           </a:p>
           <a:p>
@@ -30229,7 +30269,7 @@
           <a:p>
             <a:r>
               <a:rPr lang="en-US" dirty="0"/>
-              <a:t>Current configuration for ordering application</a:t>
+              <a:t>Current configuration for claims application</a:t>
             </a:r>
           </a:p>
         </p:txBody>
@@ -31448,6 +31488,15 @@
 </file>
 
 <file path=customXml/item1.xml><?xml version="1.0" encoding="utf-8"?>
+<p:properties xmlns:p="http://schemas.microsoft.com/office/2006/metadata/properties" xmlns:xsi="http://www.w3.org/2001/XMLSchema-instance" xmlns:pc="http://schemas.microsoft.com/office/infopath/2007/PartnerControls">
+  <documentManagement>
+    <_ip_UnifiedCompliancePolicyUIAction xmlns="http://schemas.microsoft.com/sharepoint/v3" xsi:nil="true"/>
+    <_ip_UnifiedCompliancePolicyProperties xmlns="http://schemas.microsoft.com/sharepoint/v3" xsi:nil="true"/>
+  </documentManagement>
+</p:properties>
+</file>
+
+<file path=customXml/item2.xml><?xml version="1.0" encoding="utf-8"?>
 <ct:contentTypeSchema xmlns:ct="http://schemas.microsoft.com/office/2006/metadata/contentType" xmlns:ma="http://schemas.microsoft.com/office/2006/metadata/properties/metaAttributes" ct:_="" ma:_="" ma:contentTypeName="Document" ma:contentTypeID="0x010100D15DFA3690A15B4081582BBCC6BEAC3E" ma:contentTypeVersion="9" ma:contentTypeDescription="Create a new document." ma:contentTypeScope="" ma:versionID="642da1784587cbe85a7fdbbe4dc36103">
   <xsd:schema xmlns:xsd="http://www.w3.org/2001/XMLSchema" xmlns:xs="http://www.w3.org/2001/XMLSchema" xmlns:p="http://schemas.microsoft.com/office/2006/metadata/properties" xmlns:ns1="http://schemas.microsoft.com/sharepoint/v3" xmlns:ns2="2023ac63-7b75-4916-a9ee-591457758eee" xmlns:ns3="d9c797ad-d7c3-4982-82b7-81352a75e4a5" targetNamespace="http://schemas.microsoft.com/office/2006/metadata/properties" ma:root="true" ma:fieldsID="91198b0246576053cc55dd2c67035a89" ns1:_="" ns2:_="" ns3:_="">
     <xsd:import namespace="http://schemas.microsoft.com/sharepoint/v3"/>
@@ -31649,15 +31698,6 @@
 </ct:contentTypeSchema>
 </file>
 
-<file path=customXml/item2.xml><?xml version="1.0" encoding="utf-8"?>
-<p:properties xmlns:p="http://schemas.microsoft.com/office/2006/metadata/properties" xmlns:xsi="http://www.w3.org/2001/XMLSchema-instance" xmlns:pc="http://schemas.microsoft.com/office/infopath/2007/PartnerControls">
-  <documentManagement>
-    <_ip_UnifiedCompliancePolicyUIAction xmlns="http://schemas.microsoft.com/sharepoint/v3" xsi:nil="true"/>
-    <_ip_UnifiedCompliancePolicyProperties xmlns="http://schemas.microsoft.com/sharepoint/v3" xsi:nil="true"/>
-  </documentManagement>
-</p:properties>
-</file>
-
 <file path=customXml/item3.xml><?xml version="1.0" encoding="utf-8"?>
 <?mso-contentType ?>
 <FormTemplates xmlns="http://schemas.microsoft.com/sharepoint/v3/contenttype/forms">
@@ -31668,6 +31708,24 @@
 </file>
 
 <file path=customXml/itemProps1.xml><?xml version="1.0" encoding="utf-8"?>
+<ds:datastoreItem xmlns:ds="http://schemas.openxmlformats.org/officeDocument/2006/customXml" ds:itemID="{7D07577D-30E5-48FB-B81C-E1B9EAC126B5}">
+  <ds:schemaRefs>
+    <ds:schemaRef ds:uri="http://schemas.openxmlformats.org/package/2006/metadata/core-properties"/>
+    <ds:schemaRef ds:uri="http://schemas.microsoft.com/office/infopath/2007/PartnerControls"/>
+    <ds:schemaRef ds:uri="http://purl.org/dc/terms/"/>
+    <ds:schemaRef ds:uri="2023ac63-7b75-4916-a9ee-591457758eee"/>
+    <ds:schemaRef ds:uri="http://schemas.microsoft.com/office/2006/documentManagement/types"/>
+    <ds:schemaRef ds:uri="d9c797ad-d7c3-4982-82b7-81352a75e4a5"/>
+    <ds:schemaRef ds:uri="http://schemas.microsoft.com/sharepoint/v3"/>
+    <ds:schemaRef ds:uri="http://purl.org/dc/elements/1.1/"/>
+    <ds:schemaRef ds:uri="http://schemas.microsoft.com/office/2006/metadata/properties"/>
+    <ds:schemaRef ds:uri="http://www.w3.org/XML/1998/namespace"/>
+    <ds:schemaRef ds:uri="http://purl.org/dc/dcmitype/"/>
+  </ds:schemaRefs>
+</ds:datastoreItem>
+</file>
+
+<file path=customXml/itemProps2.xml><?xml version="1.0" encoding="utf-8"?>
 <ds:datastoreItem xmlns:ds="http://schemas.openxmlformats.org/officeDocument/2006/customXml" ds:itemID="{A26E40F2-DB1A-4ED5-85D8-FAE814896E97}">
   <ds:schemaRefs>
     <ds:schemaRef ds:uri="http://schemas.microsoft.com/office/2006/metadata/contentType"/>
@@ -31687,24 +31745,6 @@
 </ds:datastoreItem>
 </file>
 
-<file path=customXml/itemProps2.xml><?xml version="1.0" encoding="utf-8"?>
-<ds:datastoreItem xmlns:ds="http://schemas.openxmlformats.org/officeDocument/2006/customXml" ds:itemID="{7D07577D-30E5-48FB-B81C-E1B9EAC126B5}">
-  <ds:schemaRefs>
-    <ds:schemaRef ds:uri="http://schemas.openxmlformats.org/package/2006/metadata/core-properties"/>
-    <ds:schemaRef ds:uri="http://schemas.microsoft.com/office/infopath/2007/PartnerControls"/>
-    <ds:schemaRef ds:uri="http://purl.org/dc/terms/"/>
-    <ds:schemaRef ds:uri="2023ac63-7b75-4916-a9ee-591457758eee"/>
-    <ds:schemaRef ds:uri="http://schemas.microsoft.com/office/2006/documentManagement/types"/>
-    <ds:schemaRef ds:uri="d9c797ad-d7c3-4982-82b7-81352a75e4a5"/>
-    <ds:schemaRef ds:uri="http://schemas.microsoft.com/sharepoint/v3"/>
-    <ds:schemaRef ds:uri="http://purl.org/dc/elements/1.1/"/>
-    <ds:schemaRef ds:uri="http://schemas.microsoft.com/office/2006/metadata/properties"/>
-    <ds:schemaRef ds:uri="http://www.w3.org/XML/1998/namespace"/>
-    <ds:schemaRef ds:uri="http://purl.org/dc/dcmitype/"/>
-  </ds:schemaRefs>
-</ds:datastoreItem>
-</file>
-
 <file path=customXml/itemProps3.xml><?xml version="1.0" encoding="utf-8"?>
 <ds:datastoreItem xmlns:ds="http://schemas.openxmlformats.org/officeDocument/2006/customXml" ds:itemID="{D5A22677-9165-4AB6-9580-CE94CCD209C5}">
   <ds:schemaRefs>

</xml_diff>

<commit_message>
Update WDS trainer presentation - Building a resilient IaaS architecture.pptx
Tweak for consistency with student/trainer guides
</commit_message>
<xml_diff>
--- a/Whiteboard design session/WDS trainer presentation - Building a resilient IaaS architecture.pptx
+++ b/Whiteboard design session/WDS trainer presentation - Building a resilient IaaS architecture.pptx
@@ -238,7 +238,7 @@
           <a:p>
             <a:fld id="{D12B4A29-5F37-4DEF-BB05-EEA5E91F514E}" type="datetimeFigureOut">
               <a:rPr lang="en-US" smtClean="0"/>
-              <a:t>7/1/20</a:t>
+              <a:t>7/23/2020</a:t>
             </a:fld>
             <a:endParaRPr lang="en-US"/>
           </a:p>
@@ -21730,7 +21730,15 @@
             </a:pPr>
             <a:r>
               <a:rPr lang="en-US" sz="3200" dirty="0"/>
-              <a:t>Redundancy and resiliency for the ADDS domain controller server, and the web and database servers for the claims application, to deliver the 99.95% or greater SLA required by the business.</a:t>
+              <a:t>Redundancy and resiliency for </a:t>
+            </a:r>
+            <a:r>
+              <a:rPr lang="en-US" sz="3200"/>
+              <a:t>the AD DS </a:t>
+            </a:r>
+            <a:r>
+              <a:rPr lang="en-US" sz="3200" dirty="0"/>
+              <a:t>domain controller server, and the web and database servers for the claims application, to deliver the 99.95% or greater SLA required by the business.</a:t>
             </a:r>
           </a:p>
           <a:p>
@@ -31438,21 +31446,21 @@
 </file>
 
 <file path=customXml/item2.xml><?xml version="1.0" encoding="utf-8"?>
+<?mso-contentType ?>
+<FormTemplates xmlns="http://schemas.microsoft.com/sharepoint/v3/contenttype/forms">
+  <Display>DocumentLibraryForm</Display>
+  <Edit>DocumentLibraryForm</Edit>
+  <New>DocumentLibraryForm</New>
+</FormTemplates>
+</file>
+
+<file path=customXml/item3.xml><?xml version="1.0" encoding="utf-8"?>
 <p:properties xmlns:p="http://schemas.microsoft.com/office/2006/metadata/properties" xmlns:xsi="http://www.w3.org/2001/XMLSchema-instance" xmlns:pc="http://schemas.microsoft.com/office/infopath/2007/PartnerControls">
   <documentManagement>
     <_ip_UnifiedCompliancePolicyUIAction xmlns="http://schemas.microsoft.com/sharepoint/v3" xsi:nil="true"/>
     <_ip_UnifiedCompliancePolicyProperties xmlns="http://schemas.microsoft.com/sharepoint/v3" xsi:nil="true"/>
   </documentManagement>
 </p:properties>
-</file>
-
-<file path=customXml/item3.xml><?xml version="1.0" encoding="utf-8"?>
-<?mso-contentType ?>
-<FormTemplates xmlns="http://schemas.microsoft.com/sharepoint/v3/contenttype/forms">
-  <Display>DocumentLibraryForm</Display>
-  <Edit>DocumentLibraryForm</Edit>
-  <New>DocumentLibraryForm</New>
-</FormTemplates>
 </file>
 
 <file path=customXml/itemProps1.xml><?xml version="1.0" encoding="utf-8"?>
@@ -31476,6 +31484,14 @@
 </file>
 
 <file path=customXml/itemProps2.xml><?xml version="1.0" encoding="utf-8"?>
+<ds:datastoreItem xmlns:ds="http://schemas.openxmlformats.org/officeDocument/2006/customXml" ds:itemID="{D5A22677-9165-4AB6-9580-CE94CCD209C5}">
+  <ds:schemaRefs>
+    <ds:schemaRef ds:uri="http://schemas.microsoft.com/sharepoint/v3/contenttype/forms"/>
+  </ds:schemaRefs>
+</ds:datastoreItem>
+</file>
+
+<file path=customXml/itemProps3.xml><?xml version="1.0" encoding="utf-8"?>
 <ds:datastoreItem xmlns:ds="http://schemas.openxmlformats.org/officeDocument/2006/customXml" ds:itemID="{7D07577D-30E5-48FB-B81C-E1B9EAC126B5}">
   <ds:schemaRefs>
     <ds:schemaRef ds:uri="http://schemas.openxmlformats.org/package/2006/metadata/core-properties"/>
@@ -31491,12 +31507,4 @@
     <ds:schemaRef ds:uri="http://purl.org/dc/dcmitype/"/>
   </ds:schemaRefs>
 </ds:datastoreItem>
-</file>
-
-<file path=customXml/itemProps3.xml><?xml version="1.0" encoding="utf-8"?>
-<ds:datastoreItem xmlns:ds="http://schemas.openxmlformats.org/officeDocument/2006/customXml" ds:itemID="{D5A22677-9165-4AB6-9580-CE94CCD209C5}">
-  <ds:schemaRefs>
-    <ds:schemaRef ds:uri="http://schemas.microsoft.com/sharepoint/v3/contenttype/forms"/>
-  </ds:schemaRefs>
-</ds:datastoreItem>
 </file>
</xml_diff>

<commit_message>
update dates to confirm reivew of WDS adn HOL
</commit_message>
<xml_diff>
--- a/Whiteboard design session/WDS trainer presentation - Building a resilient IaaS architecture.pptx
+++ b/Whiteboard design session/WDS trainer presentation - Building a resilient IaaS architecture.pptx
@@ -238,7 +238,7 @@
           <a:p>
             <a:fld id="{D12B4A29-5F37-4DEF-BB05-EEA5E91F514E}" type="datetimeFigureOut">
               <a:rPr lang="en-US" smtClean="0"/>
-              <a:t>10/29/2021</a:t>
+              <a:t>5/25/22</a:t>
             </a:fld>
             <a:endParaRPr lang="en-US" dirty="0"/>
           </a:p>
@@ -21620,10 +21620,9 @@
           <a:lstStyle/>
           <a:p>
             <a:r>
-              <a:rPr lang="en-US"/>
-              <a:t>September 2021</a:t>
-            </a:r>
-            <a:endParaRPr lang="en-US" dirty="0"/>
+              <a:rPr lang="en-US" dirty="0"/>
+              <a:t>May 2022</a:t>
+            </a:r>
           </a:p>
         </p:txBody>
       </p:sp>
@@ -31256,21 +31255,21 @@
 </file>
 
 <file path=customXml/item1.xml><?xml version="1.0" encoding="utf-8"?>
+<p:properties xmlns:p="http://schemas.microsoft.com/office/2006/metadata/properties" xmlns:xsi="http://www.w3.org/2001/XMLSchema-instance" xmlns:pc="http://schemas.microsoft.com/office/infopath/2007/PartnerControls">
+  <documentManagement>
+    <_ip_UnifiedCompliancePolicyUIAction xmlns="http://schemas.microsoft.com/sharepoint/v3" xsi:nil="true"/>
+    <_ip_UnifiedCompliancePolicyProperties xmlns="http://schemas.microsoft.com/sharepoint/v3" xsi:nil="true"/>
+  </documentManagement>
+</p:properties>
+</file>
+
+<file path=customXml/item2.xml><?xml version="1.0" encoding="utf-8"?>
 <?mso-contentType ?>
 <FormTemplates xmlns="http://schemas.microsoft.com/sharepoint/v3/contenttype/forms">
   <Display>DocumentLibraryForm</Display>
   <Edit>DocumentLibraryForm</Edit>
   <New>DocumentLibraryForm</New>
 </FormTemplates>
-</file>
-
-<file path=customXml/item2.xml><?xml version="1.0" encoding="utf-8"?>
-<p:properties xmlns:p="http://schemas.microsoft.com/office/2006/metadata/properties" xmlns:xsi="http://www.w3.org/2001/XMLSchema-instance" xmlns:pc="http://schemas.microsoft.com/office/infopath/2007/PartnerControls">
-  <documentManagement>
-    <_ip_UnifiedCompliancePolicyUIAction xmlns="http://schemas.microsoft.com/sharepoint/v3" xsi:nil="true"/>
-    <_ip_UnifiedCompliancePolicyProperties xmlns="http://schemas.microsoft.com/sharepoint/v3" xsi:nil="true"/>
-  </documentManagement>
-</p:properties>
 </file>
 
 <file path=customXml/item3.xml><?xml version="1.0" encoding="utf-8"?>
@@ -31476,14 +31475,6 @@
 </file>
 
 <file path=customXml/itemProps1.xml><?xml version="1.0" encoding="utf-8"?>
-<ds:datastoreItem xmlns:ds="http://schemas.openxmlformats.org/officeDocument/2006/customXml" ds:itemID="{D5A22677-9165-4AB6-9580-CE94CCD209C5}">
-  <ds:schemaRefs>
-    <ds:schemaRef ds:uri="http://schemas.microsoft.com/sharepoint/v3/contenttype/forms"/>
-  </ds:schemaRefs>
-</ds:datastoreItem>
-</file>
-
-<file path=customXml/itemProps2.xml><?xml version="1.0" encoding="utf-8"?>
 <ds:datastoreItem xmlns:ds="http://schemas.openxmlformats.org/officeDocument/2006/customXml" ds:itemID="{7D07577D-30E5-48FB-B81C-E1B9EAC126B5}">
   <ds:schemaRefs>
     <ds:schemaRef ds:uri="http://schemas.openxmlformats.org/package/2006/metadata/core-properties"/>
@@ -31497,6 +31488,14 @@
     <ds:schemaRef ds:uri="http://schemas.microsoft.com/office/2006/metadata/properties"/>
     <ds:schemaRef ds:uri="http://www.w3.org/XML/1998/namespace"/>
     <ds:schemaRef ds:uri="http://purl.org/dc/dcmitype/"/>
+  </ds:schemaRefs>
+</ds:datastoreItem>
+</file>
+
+<file path=customXml/itemProps2.xml><?xml version="1.0" encoding="utf-8"?>
+<ds:datastoreItem xmlns:ds="http://schemas.openxmlformats.org/officeDocument/2006/customXml" ds:itemID="{D5A22677-9165-4AB6-9580-CE94CCD209C5}">
+  <ds:schemaRefs>
+    <ds:schemaRef ds:uri="http://schemas.microsoft.com/sharepoint/v3/contenttype/forms"/>
   </ds:schemaRefs>
 </ds:datastoreItem>
 </file>

</xml_diff>